<commit_message>
grpo decoder training method setup
</commit_message>
<xml_diff>
--- a/cognitive_music/Cognitive Audio.pptx
+++ b/cognitive_music/Cognitive Audio.pptx
@@ -267,7 +267,7 @@
           <a:p>
             <a:fld id="{E70142CA-9D5D-413D-9993-8CF5D57032C0}" type="datetimeFigureOut">
               <a:rPr lang="en-US" smtClean="0"/>
-              <a:t>1/27/2025</a:t>
+              <a:t>1/28/2025</a:t>
             </a:fld>
             <a:endParaRPr lang="en-US"/>
           </a:p>
@@ -465,7 +465,7 @@
           <a:p>
             <a:fld id="{E70142CA-9D5D-413D-9993-8CF5D57032C0}" type="datetimeFigureOut">
               <a:rPr lang="en-US" smtClean="0"/>
-              <a:t>1/27/2025</a:t>
+              <a:t>1/28/2025</a:t>
             </a:fld>
             <a:endParaRPr lang="en-US"/>
           </a:p>
@@ -673,7 +673,7 @@
           <a:p>
             <a:fld id="{E70142CA-9D5D-413D-9993-8CF5D57032C0}" type="datetimeFigureOut">
               <a:rPr lang="en-US" smtClean="0"/>
-              <a:t>1/27/2025</a:t>
+              <a:t>1/28/2025</a:t>
             </a:fld>
             <a:endParaRPr lang="en-US"/>
           </a:p>
@@ -871,7 +871,7 @@
           <a:p>
             <a:fld id="{E70142CA-9D5D-413D-9993-8CF5D57032C0}" type="datetimeFigureOut">
               <a:rPr lang="en-US" smtClean="0"/>
-              <a:t>1/27/2025</a:t>
+              <a:t>1/28/2025</a:t>
             </a:fld>
             <a:endParaRPr lang="en-US"/>
           </a:p>
@@ -1146,7 +1146,7 @@
           <a:p>
             <a:fld id="{E70142CA-9D5D-413D-9993-8CF5D57032C0}" type="datetimeFigureOut">
               <a:rPr lang="en-US" smtClean="0"/>
-              <a:t>1/27/2025</a:t>
+              <a:t>1/28/2025</a:t>
             </a:fld>
             <a:endParaRPr lang="en-US"/>
           </a:p>
@@ -1411,7 +1411,7 @@
           <a:p>
             <a:fld id="{E70142CA-9D5D-413D-9993-8CF5D57032C0}" type="datetimeFigureOut">
               <a:rPr lang="en-US" smtClean="0"/>
-              <a:t>1/27/2025</a:t>
+              <a:t>1/28/2025</a:t>
             </a:fld>
             <a:endParaRPr lang="en-US"/>
           </a:p>
@@ -1823,7 +1823,7 @@
           <a:p>
             <a:fld id="{E70142CA-9D5D-413D-9993-8CF5D57032C0}" type="datetimeFigureOut">
               <a:rPr lang="en-US" smtClean="0"/>
-              <a:t>1/27/2025</a:t>
+              <a:t>1/28/2025</a:t>
             </a:fld>
             <a:endParaRPr lang="en-US"/>
           </a:p>
@@ -1964,7 +1964,7 @@
           <a:p>
             <a:fld id="{E70142CA-9D5D-413D-9993-8CF5D57032C0}" type="datetimeFigureOut">
               <a:rPr lang="en-US" smtClean="0"/>
-              <a:t>1/27/2025</a:t>
+              <a:t>1/28/2025</a:t>
             </a:fld>
             <a:endParaRPr lang="en-US"/>
           </a:p>
@@ -2077,7 +2077,7 @@
           <a:p>
             <a:fld id="{E70142CA-9D5D-413D-9993-8CF5D57032C0}" type="datetimeFigureOut">
               <a:rPr lang="en-US" smtClean="0"/>
-              <a:t>1/27/2025</a:t>
+              <a:t>1/28/2025</a:t>
             </a:fld>
             <a:endParaRPr lang="en-US"/>
           </a:p>
@@ -2388,7 +2388,7 @@
           <a:p>
             <a:fld id="{E70142CA-9D5D-413D-9993-8CF5D57032C0}" type="datetimeFigureOut">
               <a:rPr lang="en-US" smtClean="0"/>
-              <a:t>1/27/2025</a:t>
+              <a:t>1/28/2025</a:t>
             </a:fld>
             <a:endParaRPr lang="en-US"/>
           </a:p>
@@ -2676,7 +2676,7 @@
           <a:p>
             <a:fld id="{E70142CA-9D5D-413D-9993-8CF5D57032C0}" type="datetimeFigureOut">
               <a:rPr lang="en-US" smtClean="0"/>
-              <a:t>1/27/2025</a:t>
+              <a:t>1/28/2025</a:t>
             </a:fld>
             <a:endParaRPr lang="en-US"/>
           </a:p>
@@ -2917,7 +2917,7 @@
           <a:p>
             <a:fld id="{E70142CA-9D5D-413D-9993-8CF5D57032C0}" type="datetimeFigureOut">
               <a:rPr lang="en-US" smtClean="0"/>
-              <a:t>1/27/2025</a:t>
+              <a:t>1/28/2025</a:t>
             </a:fld>
             <a:endParaRPr lang="en-US"/>
           </a:p>
@@ -3433,7 +3433,7 @@
             <a:pPr algn="l"/>
             <a:r>
               <a:rPr lang="en-US" sz="6600" dirty="0"/>
-              <a:t>Cognitive Music</a:t>
+              <a:t>Cognitive Audio</a:t>
             </a:r>
           </a:p>
         </p:txBody>
@@ -4247,8 +4247,8 @@
         </p:nvSpPr>
         <p:spPr>
           <a:xfrm rot="5400000">
-            <a:off x="2649710" y="2753860"/>
-            <a:ext cx="1796528" cy="1312433"/>
+            <a:off x="3185434" y="1815748"/>
+            <a:ext cx="1706074" cy="1312433"/>
           </a:xfrm>
           <a:prstGeom prst="snip2SameRect">
             <a:avLst>
@@ -4312,7 +4312,7 @@
         </p:nvSpPr>
         <p:spPr>
           <a:xfrm rot="16200000">
-            <a:off x="5847249" y="2902662"/>
+            <a:off x="6337746" y="2009777"/>
             <a:ext cx="3124074" cy="2369977"/>
           </a:xfrm>
           <a:prstGeom prst="snip2SameRect">
@@ -4398,8 +4398,8 @@
         </p:nvSpPr>
         <p:spPr>
           <a:xfrm>
-            <a:off x="1429732" y="3090660"/>
-            <a:ext cx="1435008" cy="1200329"/>
+            <a:off x="1103353" y="2191893"/>
+            <a:ext cx="2233304" cy="1200329"/>
           </a:xfrm>
           <a:prstGeom prst="rect">
             <a:avLst/>
@@ -4412,30 +4412,33 @@
           </a:bodyPr>
           <a:lstStyle/>
           <a:p>
+            <a:pPr algn="r"/>
             <a:r>
               <a:rPr lang="en-US" dirty="0"/>
               <a:t>Activity Data</a:t>
             </a:r>
           </a:p>
           <a:p>
+            <a:pPr algn="r"/>
             <a:r>
               <a:rPr lang="en-US" dirty="0"/>
-              <a:t>(HR)</a:t>
-            </a:r>
-            <a:br>
-              <a:rPr lang="en-US" dirty="0"/>
-            </a:br>
-            <a:r>
-              <a:rPr lang="en-US" dirty="0"/>
-              <a:t>(Accel)</a:t>
-            </a:r>
-          </a:p>
-          <a:p>
+              <a:t>(HR, Accel)</a:t>
+            </a:r>
+          </a:p>
+          <a:p>
+            <a:pPr algn="r"/>
             <a:r>
               <a:rPr lang="en-US" dirty="0"/>
               <a:t>(Audio)</a:t>
             </a:r>
           </a:p>
+          <a:p>
+            <a:pPr algn="r"/>
+            <a:r>
+              <a:rPr lang="en-US" dirty="0"/>
+              <a:t>Temperature Control</a:t>
+            </a:r>
+          </a:p>
         </p:txBody>
       </p:sp>
       <p:sp>
@@ -4452,7 +4455,7 @@
         </p:nvSpPr>
         <p:spPr>
           <a:xfrm>
-            <a:off x="1429732" y="2438447"/>
+            <a:off x="2006290" y="1618125"/>
             <a:ext cx="1286186" cy="646331"/>
           </a:xfrm>
           <a:prstGeom prst="rect">
@@ -4466,12 +4469,14 @@
           </a:bodyPr>
           <a:lstStyle/>
           <a:p>
+            <a:pPr algn="r"/>
             <a:r>
               <a:rPr lang="en-US" dirty="0"/>
               <a:t>Static Data</a:t>
             </a:r>
           </a:p>
           <a:p>
+            <a:pPr algn="r"/>
             <a:r>
               <a:rPr lang="en-US" dirty="0"/>
               <a:t>(pers. Info)</a:t>
@@ -4493,7 +4498,7 @@
         </p:nvSpPr>
         <p:spPr>
           <a:xfrm>
-            <a:off x="4204189" y="3217203"/>
+            <a:off x="4694686" y="2297423"/>
             <a:ext cx="2020105" cy="369332"/>
           </a:xfrm>
           <a:prstGeom prst="rect">
@@ -4528,8 +4533,8 @@
         </p:nvSpPr>
         <p:spPr>
           <a:xfrm>
-            <a:off x="4443084" y="3564148"/>
-            <a:ext cx="1741438" cy="1477328"/>
+            <a:off x="3992873" y="2714295"/>
+            <a:ext cx="2682146" cy="1200329"/>
           </a:xfrm>
           <a:prstGeom prst="rect">
             <a:avLst/>
@@ -4552,19 +4557,15 @@
             <a:pPr algn="r"/>
             <a:r>
               <a:rPr lang="en-US" dirty="0"/>
-              <a:t>Manual Tuning</a:t>
+              <a:t>(Semantic info, HR, FFT?)</a:t>
             </a:r>
           </a:p>
           <a:p>
             <a:pPr algn="r"/>
             <a:r>
               <a:rPr lang="en-US" dirty="0"/>
-              <a:t>Prompt</a:t>
-            </a:r>
-          </a:p>
-          <a:p>
-            <a:pPr algn="r"/>
-            <a:endParaRPr lang="en-US" dirty="0"/>
+              <a:t>User Prompt Info</a:t>
+            </a:r>
           </a:p>
           <a:p>
             <a:pPr algn="r"/>
@@ -4589,7 +4590,7 @@
         </p:nvSpPr>
         <p:spPr>
           <a:xfrm>
-            <a:off x="8617726" y="3848553"/>
+            <a:off x="9108223" y="2955668"/>
             <a:ext cx="1528047" cy="369332"/>
           </a:xfrm>
           <a:prstGeom prst="rect">
@@ -4606,6 +4607,161 @@
             <a:r>
               <a:rPr lang="en-US" dirty="0"/>
               <a:t>Audio Stream</a:t>
+            </a:r>
+          </a:p>
+        </p:txBody>
+      </p:sp>
+      <p:sp>
+        <p:nvSpPr>
+          <p:cNvPr id="3" name="TextBox 2">
+            <a:extLst>
+              <a:ext uri="{FF2B5EF4-FFF2-40B4-BE49-F238E27FC236}">
+                <a16:creationId xmlns:a16="http://schemas.microsoft.com/office/drawing/2014/main" id="{C1D147F6-0B6B-40CD-DD23-FA8D86ED62EA}"/>
+              </a:ext>
+            </a:extLst>
+          </p:cNvPr>
+          <p:cNvSpPr txBox="1"/>
+          <p:nvPr/>
+        </p:nvSpPr>
+        <p:spPr>
+          <a:xfrm>
+            <a:off x="838202" y="4213985"/>
+            <a:ext cx="5034070" cy="923330"/>
+          </a:xfrm>
+          <a:prstGeom prst="rect">
+            <a:avLst/>
+          </a:prstGeom>
+          <a:noFill/>
+        </p:spPr>
+        <p:txBody>
+          <a:bodyPr wrap="none" rtlCol="0">
+            <a:spAutoFit/>
+          </a:bodyPr>
+          <a:lstStyle/>
+          <a:p>
+            <a:r>
+              <a:rPr lang="en-US" dirty="0"/>
+              <a:t>Encoder Input Notes</a:t>
+            </a:r>
+          </a:p>
+          <a:p>
+            <a:pPr marL="285750" indent="-285750">
+              <a:buFontTx/>
+              <a:buChar char="-"/>
+            </a:pPr>
+            <a:r>
+              <a:rPr lang="en-US" dirty="0"/>
+              <a:t>maybe incorporate video, audio (model </a:t>
+            </a:r>
+            <a:r>
+              <a:rPr lang="en-US" dirty="0" err="1"/>
+              <a:t>impl</a:t>
+            </a:r>
+            <a:r>
+              <a:rPr lang="en-US" dirty="0"/>
+              <a:t>.)</a:t>
+            </a:r>
+          </a:p>
+          <a:p>
+            <a:pPr marL="285750" indent="-285750">
+              <a:buFontTx/>
+              <a:buChar char="-"/>
+            </a:pPr>
+            <a:r>
+              <a:rPr lang="en-US" dirty="0"/>
+              <a:t>Consider surprise-style </a:t>
+            </a:r>
+            <a:r>
+              <a:rPr lang="en-US" b="1" dirty="0"/>
+              <a:t>query trigger</a:t>
+            </a:r>
+          </a:p>
+        </p:txBody>
+      </p:sp>
+      <p:sp>
+        <p:nvSpPr>
+          <p:cNvPr id="5" name="TextBox 4">
+            <a:extLst>
+              <a:ext uri="{FF2B5EF4-FFF2-40B4-BE49-F238E27FC236}">
+                <a16:creationId xmlns:a16="http://schemas.microsoft.com/office/drawing/2014/main" id="{00972128-EDF0-9C50-FE1D-D5F164709179}"/>
+              </a:ext>
+            </a:extLst>
+          </p:cNvPr>
+          <p:cNvSpPr txBox="1"/>
+          <p:nvPr/>
+        </p:nvSpPr>
+        <p:spPr>
+          <a:xfrm>
+            <a:off x="5191463" y="5264649"/>
+            <a:ext cx="5158015" cy="1477328"/>
+          </a:xfrm>
+          <a:prstGeom prst="rect">
+            <a:avLst/>
+          </a:prstGeom>
+          <a:noFill/>
+        </p:spPr>
+        <p:txBody>
+          <a:bodyPr wrap="none" rtlCol="0">
+            <a:spAutoFit/>
+          </a:bodyPr>
+          <a:lstStyle/>
+          <a:p>
+            <a:r>
+              <a:rPr lang="en-US" dirty="0"/>
+              <a:t>Decoder Input Notes</a:t>
+            </a:r>
+          </a:p>
+          <a:p>
+            <a:pPr marL="285750" indent="-285750">
+              <a:buFontTx/>
+              <a:buChar char="-"/>
+            </a:pPr>
+            <a:r>
+              <a:rPr lang="en-US" dirty="0"/>
+              <a:t>Heartrate Info or FFT?</a:t>
+            </a:r>
+          </a:p>
+          <a:p>
+            <a:pPr marL="285750" indent="-285750">
+              <a:buFontTx/>
+              <a:buChar char="-"/>
+            </a:pPr>
+            <a:r>
+              <a:rPr lang="en-US" dirty="0"/>
+              <a:t>prediction length </a:t>
+            </a:r>
+            <a:r>
+              <a:rPr lang="en-US" dirty="0" err="1"/>
+              <a:t>impl</a:t>
+            </a:r>
+            <a:endParaRPr lang="en-US" dirty="0"/>
+          </a:p>
+          <a:p>
+            <a:pPr marL="285750" indent="-285750">
+              <a:buFontTx/>
+              <a:buChar char="-"/>
+            </a:pPr>
+            <a:r>
+              <a:rPr lang="en-US" b="1" dirty="0"/>
+              <a:t>glue method with segment retrieval</a:t>
+            </a:r>
+          </a:p>
+          <a:p>
+            <a:pPr marL="742950" lvl="1" indent="-285750">
+              <a:buFontTx/>
+              <a:buChar char="-"/>
+            </a:pPr>
+            <a:r>
+              <a:rPr lang="en-US" b="1" dirty="0"/>
+              <a:t>Can </a:t>
+            </a:r>
+            <a:r>
+              <a:rPr lang="en-US" b="1" dirty="0" err="1"/>
+              <a:t>pregenerate</a:t>
+            </a:r>
+            <a:r>
+              <a:rPr lang="en-US" b="1" dirty="0"/>
+              <a:t> segments or semantics</a:t>
             </a:r>
           </a:p>
         </p:txBody>

</xml_diff>